<commit_message>
slide de slogam do codigo
</commit_message>
<xml_diff>
--- a/apresentacao.pptx
+++ b/apresentacao.pptx
@@ -6,6 +6,7 @@
   </p:sldMasterIdLst>
   <p:sldIdLst>
     <p:sldId id="256" r:id="rId2"/>
+    <p:sldId id="257" r:id="rId3"/>
   </p:sldIdLst>
   <p:sldSz cx="12192000" cy="6858000"/>
   <p:notesSz cx="6858000" cy="9144000"/>
@@ -104,11 +105,72 @@
       </a:defRPr>
     </a:lvl9pPr>
   </p:defaultTextStyle>
+  <p:extLst>
+    <p:ext uri="{EFAFB233-063F-42B5-8137-9DF3F51BA10A}">
+      <p15:sldGuideLst xmlns:p15="http://schemas.microsoft.com/office/powerpoint/2012/main"/>
+    </p:ext>
+  </p:extLst>
 </p:presentation>
+</file>
+
+<file path=ppt/revisionInfo.xml><?xml version="1.0" encoding="utf-8"?>
+<p1510:revInfo xmlns:a="http://schemas.openxmlformats.org/drawingml/2006/main" xmlns:r="http://schemas.openxmlformats.org/officeDocument/2006/relationships" xmlns:p1510="http://schemas.microsoft.com/office/powerpoint/2015/10/main">
+  <p1510:revLst>
+    <p1510:client id="{6D07F7D0-0EAD-434B-95A5-90554DF699D7}" v="1" dt="2022-03-20T12:06:46.727"/>
+  </p1510:revLst>
+</p1510:revInfo>
 </file>
 
 <file path=ppt/changesInfos/changesInfo1.xml><?xml version="1.0" encoding="utf-8"?>
 <pc:chgInfo xmlns:a="http://schemas.openxmlformats.org/drawingml/2006/main" xmlns:r="http://schemas.openxmlformats.org/officeDocument/2006/relationships" xmlns:ac="http://schemas.microsoft.com/office/drawing/2013/main/command" xmlns:pc="http://schemas.microsoft.com/office/powerpoint/2013/main/command">
+  <pc:docChgLst>
+    <pc:chgData name="Giovana Soares" userId="fcb595cf08655345" providerId="LiveId" clId="{6D07F7D0-0EAD-434B-95A5-90554DF699D7}"/>
+    <pc:docChg chg="custSel addSld modSld">
+      <pc:chgData name="Giovana Soares" userId="fcb595cf08655345" providerId="LiveId" clId="{6D07F7D0-0EAD-434B-95A5-90554DF699D7}" dt="2022-03-20T12:07:29.528" v="32" actId="478"/>
+      <pc:docMkLst>
+        <pc:docMk/>
+      </pc:docMkLst>
+      <pc:sldChg chg="addSp delSp modSp new mod">
+        <pc:chgData name="Giovana Soares" userId="fcb595cf08655345" providerId="LiveId" clId="{6D07F7D0-0EAD-434B-95A5-90554DF699D7}" dt="2022-03-20T12:07:29.528" v="32" actId="478"/>
+        <pc:sldMkLst>
+          <pc:docMk/>
+          <pc:sldMk cId="2896927399" sldId="257"/>
+        </pc:sldMkLst>
+        <pc:spChg chg="del">
+          <ac:chgData name="Giovana Soares" userId="fcb595cf08655345" providerId="LiveId" clId="{6D07F7D0-0EAD-434B-95A5-90554DF699D7}" dt="2022-03-20T12:06:37.031" v="11" actId="478"/>
+          <ac:spMkLst>
+            <pc:docMk/>
+            <pc:sldMk cId="2896927399" sldId="257"/>
+            <ac:spMk id="2" creationId="{E442C668-3ADB-435E-AD3B-61D4F3849794}"/>
+          </ac:spMkLst>
+        </pc:spChg>
+        <pc:spChg chg="del mod">
+          <ac:chgData name="Giovana Soares" userId="fcb595cf08655345" providerId="LiveId" clId="{6D07F7D0-0EAD-434B-95A5-90554DF699D7}" dt="2022-03-20T12:07:28.015" v="31" actId="478"/>
+          <ac:spMkLst>
+            <pc:docMk/>
+            <pc:sldMk cId="2896927399" sldId="257"/>
+            <ac:spMk id="3" creationId="{700E16D1-624B-493B-82A1-CA1E340A8CDF}"/>
+          </ac:spMkLst>
+        </pc:spChg>
+        <pc:spChg chg="add mod">
+          <ac:chgData name="Giovana Soares" userId="fcb595cf08655345" providerId="LiveId" clId="{6D07F7D0-0EAD-434B-95A5-90554DF699D7}" dt="2022-03-20T12:07:25.853" v="30" actId="1076"/>
+          <ac:spMkLst>
+            <pc:docMk/>
+            <pc:sldMk cId="2896927399" sldId="257"/>
+            <ac:spMk id="4" creationId="{DAA2F485-2D75-4669-B6C2-2A654A9DC576}"/>
+          </ac:spMkLst>
+        </pc:spChg>
+        <pc:spChg chg="add del mod">
+          <ac:chgData name="Giovana Soares" userId="fcb595cf08655345" providerId="LiveId" clId="{6D07F7D0-0EAD-434B-95A5-90554DF699D7}" dt="2022-03-20T12:07:29.528" v="32" actId="478"/>
+          <ac:spMkLst>
+            <pc:docMk/>
+            <pc:sldMk cId="2896927399" sldId="257"/>
+            <ac:spMk id="6" creationId="{7CB11E5D-1081-41A2-99BD-CDA8A66AC848}"/>
+          </ac:spMkLst>
+        </pc:spChg>
+      </pc:sldChg>
+    </pc:docChg>
+  </pc:docChgLst>
   <pc:docChgLst>
     <pc:chgData name="Giovana Soares" userId="fcb595cf08655345" providerId="LiveId" clId="{6746EE5A-DBEE-4351-9148-1D5394E85290}"/>
     <pc:docChg chg="custSel addSld modSld">
@@ -3427,6 +3489,99 @@
 </p:sld>
 </file>
 
+<file path=ppt/slides/slide2.xml><?xml version="1.0" encoding="utf-8"?>
+<p:sld xmlns:a="http://schemas.openxmlformats.org/drawingml/2006/main" xmlns:r="http://schemas.openxmlformats.org/officeDocument/2006/relationships" xmlns:p="http://schemas.openxmlformats.org/presentationml/2006/main">
+  <p:cSld>
+    <p:spTree>
+      <p:nvGrpSpPr>
+        <p:cNvPr id="1" name=""/>
+        <p:cNvGrpSpPr/>
+        <p:nvPr/>
+      </p:nvGrpSpPr>
+      <p:grpSpPr>
+        <a:xfrm>
+          <a:off x="0" y="0"/>
+          <a:ext cx="0" cy="0"/>
+          <a:chOff x="0" y="0"/>
+          <a:chExt cx="0" cy="0"/>
+        </a:xfrm>
+      </p:grpSpPr>
+      <p:sp>
+        <p:nvSpPr>
+          <p:cNvPr id="4" name="Retângulo 3">
+            <a:extLst>
+              <a:ext uri="{FF2B5EF4-FFF2-40B4-BE49-F238E27FC236}">
+                <a16:creationId xmlns:a16="http://schemas.microsoft.com/office/drawing/2014/main" id="{DAA2F485-2D75-4669-B6C2-2A654A9DC576}"/>
+              </a:ext>
+            </a:extLst>
+          </p:cNvPr>
+          <p:cNvSpPr/>
+          <p:nvPr/>
+        </p:nvSpPr>
+        <p:spPr>
+          <a:xfrm>
+            <a:off x="838200" y="305068"/>
+            <a:ext cx="9887712" cy="6247864"/>
+          </a:xfrm>
+          <a:prstGeom prst="rect">
+            <a:avLst/>
+          </a:prstGeom>
+          <a:noFill/>
+        </p:spPr>
+        <p:txBody>
+          <a:bodyPr wrap="square" lIns="91440" tIns="45720" rIns="91440" bIns="45720">
+            <a:spAutoFit/>
+          </a:bodyPr>
+          <a:lstStyle/>
+          <a:p>
+            <a:pPr algn="ctr"/>
+            <a:r>
+              <a:rPr lang="pt-BR" sz="20000" b="1" dirty="0">
+                <a:ln w="12700">
+                  <a:solidFill>
+                    <a:schemeClr val="tx2">
+                      <a:lumMod val="75000"/>
+                    </a:schemeClr>
+                  </a:solidFill>
+                  <a:prstDash val="solid"/>
+                </a:ln>
+                <a:pattFill prst="dkUpDiag">
+                  <a:fgClr>
+                    <a:schemeClr val="tx2"/>
+                  </a:fgClr>
+                  <a:bgClr>
+                    <a:schemeClr val="tx2">
+                      <a:lumMod val="20000"/>
+                      <a:lumOff val="80000"/>
+                    </a:schemeClr>
+                  </a:bgClr>
+                </a:pattFill>
+                <a:effectLst>
+                  <a:outerShdw dist="38100" dir="2640000" algn="bl" rotWithShape="0">
+                    <a:schemeClr val="tx2">
+                      <a:lumMod val="75000"/>
+                    </a:schemeClr>
+                  </a:outerShdw>
+                </a:effectLst>
+              </a:rPr>
+              <a:t>NOVO SLIDE</a:t>
+            </a:r>
+          </a:p>
+        </p:txBody>
+      </p:sp>
+    </p:spTree>
+    <p:extLst>
+      <p:ext uri="{BB962C8B-B14F-4D97-AF65-F5344CB8AC3E}">
+        <p14:creationId xmlns:p14="http://schemas.microsoft.com/office/powerpoint/2010/main" val="2896927399"/>
+      </p:ext>
+    </p:extLst>
+  </p:cSld>
+  <p:clrMapOvr>
+    <a:masterClrMapping/>
+  </p:clrMapOvr>
+</p:sld>
+</file>
+
 <file path=ppt/theme/theme1.xml><?xml version="1.0" encoding="utf-8"?>
 <a:theme xmlns:a="http://schemas.openxmlformats.org/drawingml/2006/main" name="Tema do Office">
   <a:themeElements>

</xml_diff>